<commit_message>
Minor updates to GitHubOgVisualStudio presentation
Also added some highlight indicators
</commit_message>
<xml_diff>
--- a/CSharpProgramming/Misc/GitHubOgVisualStudio.pptx
+++ b/CSharpProgramming/Misc/GitHubOgVisualStudio.pptx
@@ -281,7 +281,7 @@
           <a:p>
             <a:fld id="{6D8299E5-79EC-4B6A-9224-44DF7F3A0097}" type="datetimeFigureOut">
               <a:rPr lang="da-DK" smtClean="0"/>
-              <a:t>06-05-2018</a:t>
+              <a:t>07-05-2018</a:t>
             </a:fld>
             <a:endParaRPr lang="da-DK"/>
           </a:p>
@@ -451,7 +451,7 @@
           <a:p>
             <a:fld id="{6D8299E5-79EC-4B6A-9224-44DF7F3A0097}" type="datetimeFigureOut">
               <a:rPr lang="da-DK" smtClean="0"/>
-              <a:t>06-05-2018</a:t>
+              <a:t>07-05-2018</a:t>
             </a:fld>
             <a:endParaRPr lang="da-DK"/>
           </a:p>
@@ -631,7 +631,7 @@
           <a:p>
             <a:fld id="{6D8299E5-79EC-4B6A-9224-44DF7F3A0097}" type="datetimeFigureOut">
               <a:rPr lang="da-DK" smtClean="0"/>
-              <a:t>06-05-2018</a:t>
+              <a:t>07-05-2018</a:t>
             </a:fld>
             <a:endParaRPr lang="da-DK"/>
           </a:p>
@@ -801,7 +801,7 @@
           <a:p>
             <a:fld id="{6D8299E5-79EC-4B6A-9224-44DF7F3A0097}" type="datetimeFigureOut">
               <a:rPr lang="da-DK" smtClean="0"/>
-              <a:t>06-05-2018</a:t>
+              <a:t>07-05-2018</a:t>
             </a:fld>
             <a:endParaRPr lang="da-DK"/>
           </a:p>
@@ -1047,7 +1047,7 @@
           <a:p>
             <a:fld id="{6D8299E5-79EC-4B6A-9224-44DF7F3A0097}" type="datetimeFigureOut">
               <a:rPr lang="da-DK" smtClean="0"/>
-              <a:t>06-05-2018</a:t>
+              <a:t>07-05-2018</a:t>
             </a:fld>
             <a:endParaRPr lang="da-DK"/>
           </a:p>
@@ -1279,7 +1279,7 @@
           <a:p>
             <a:fld id="{6D8299E5-79EC-4B6A-9224-44DF7F3A0097}" type="datetimeFigureOut">
               <a:rPr lang="da-DK" smtClean="0"/>
-              <a:t>06-05-2018</a:t>
+              <a:t>07-05-2018</a:t>
             </a:fld>
             <a:endParaRPr lang="da-DK"/>
           </a:p>
@@ -1646,7 +1646,7 @@
           <a:p>
             <a:fld id="{6D8299E5-79EC-4B6A-9224-44DF7F3A0097}" type="datetimeFigureOut">
               <a:rPr lang="da-DK" smtClean="0"/>
-              <a:t>06-05-2018</a:t>
+              <a:t>07-05-2018</a:t>
             </a:fld>
             <a:endParaRPr lang="da-DK"/>
           </a:p>
@@ -1764,7 +1764,7 @@
           <a:p>
             <a:fld id="{6D8299E5-79EC-4B6A-9224-44DF7F3A0097}" type="datetimeFigureOut">
               <a:rPr lang="da-DK" smtClean="0"/>
-              <a:t>06-05-2018</a:t>
+              <a:t>07-05-2018</a:t>
             </a:fld>
             <a:endParaRPr lang="da-DK"/>
           </a:p>
@@ -1859,7 +1859,7 @@
           <a:p>
             <a:fld id="{6D8299E5-79EC-4B6A-9224-44DF7F3A0097}" type="datetimeFigureOut">
               <a:rPr lang="da-DK" smtClean="0"/>
-              <a:t>06-05-2018</a:t>
+              <a:t>07-05-2018</a:t>
             </a:fld>
             <a:endParaRPr lang="da-DK"/>
           </a:p>
@@ -2136,7 +2136,7 @@
           <a:p>
             <a:fld id="{6D8299E5-79EC-4B6A-9224-44DF7F3A0097}" type="datetimeFigureOut">
               <a:rPr lang="da-DK" smtClean="0"/>
-              <a:t>06-05-2018</a:t>
+              <a:t>07-05-2018</a:t>
             </a:fld>
             <a:endParaRPr lang="da-DK"/>
           </a:p>
@@ -2389,7 +2389,7 @@
           <a:p>
             <a:fld id="{6D8299E5-79EC-4B6A-9224-44DF7F3A0097}" type="datetimeFigureOut">
               <a:rPr lang="da-DK" smtClean="0"/>
-              <a:t>06-05-2018</a:t>
+              <a:t>07-05-2018</a:t>
             </a:fld>
             <a:endParaRPr lang="da-DK"/>
           </a:p>
@@ -2602,7 +2602,7 @@
           <a:p>
             <a:fld id="{6D8299E5-79EC-4B6A-9224-44DF7F3A0097}" type="datetimeFigureOut">
               <a:rPr lang="da-DK" smtClean="0"/>
-              <a:t>06-05-2018</a:t>
+              <a:t>07-05-2018</a:t>
             </a:fld>
             <a:endParaRPr lang="da-DK"/>
           </a:p>
@@ -3112,11 +3112,7 @@
           <a:p>
             <a:r>
               <a:rPr lang="da-DK" b="1"/>
-              <a:t>Føj eksisterende solution til </a:t>
-            </a:r>
-            <a:r>
-              <a:rPr lang="da-DK" b="1"/>
-              <a:t>GitHub </a:t>
+              <a:t>Føj eksisterende solution til GitHub </a:t>
             </a:r>
             <a:r>
               <a:rPr lang="da-DK" b="1" smtClean="0"/>
@@ -3200,6 +3196,98 @@
           </a:prstGeom>
         </p:spPr>
       </p:pic>
+      <p:sp>
+        <p:nvSpPr>
+          <p:cNvPr id="6" name="Ellipse 5"/>
+          <p:cNvSpPr/>
+          <p:nvPr/>
+        </p:nvSpPr>
+        <p:spPr>
+          <a:xfrm>
+            <a:off x="6528020" y="3626507"/>
+            <a:ext cx="1606164" cy="563832"/>
+          </a:xfrm>
+          <a:prstGeom prst="ellipse">
+            <a:avLst/>
+          </a:prstGeom>
+          <a:noFill/>
+          <a:ln w="76200">
+            <a:solidFill>
+              <a:srgbClr val="FF0000"/>
+            </a:solidFill>
+          </a:ln>
+        </p:spPr>
+        <p:style>
+          <a:lnRef idx="2">
+            <a:schemeClr val="accent1">
+              <a:shade val="50000"/>
+            </a:schemeClr>
+          </a:lnRef>
+          <a:fillRef idx="1">
+            <a:schemeClr val="accent1"/>
+          </a:fillRef>
+          <a:effectRef idx="0">
+            <a:schemeClr val="accent1"/>
+          </a:effectRef>
+          <a:fontRef idx="minor">
+            <a:schemeClr val="lt1"/>
+          </a:fontRef>
+        </p:style>
+        <p:txBody>
+          <a:bodyPr rtlCol="0" anchor="ctr"/>
+          <a:lstStyle/>
+          <a:p>
+            <a:pPr algn="ctr"/>
+            <a:endParaRPr lang="da-DK"/>
+          </a:p>
+        </p:txBody>
+      </p:sp>
+      <p:sp>
+        <p:nvSpPr>
+          <p:cNvPr id="7" name="Ellipse 6"/>
+          <p:cNvSpPr/>
+          <p:nvPr/>
+        </p:nvSpPr>
+        <p:spPr>
+          <a:xfrm>
+            <a:off x="10407961" y="4190339"/>
+            <a:ext cx="1606164" cy="563832"/>
+          </a:xfrm>
+          <a:prstGeom prst="ellipse">
+            <a:avLst/>
+          </a:prstGeom>
+          <a:noFill/>
+          <a:ln w="76200">
+            <a:solidFill>
+              <a:srgbClr val="FF0000"/>
+            </a:solidFill>
+          </a:ln>
+        </p:spPr>
+        <p:style>
+          <a:lnRef idx="2">
+            <a:schemeClr val="accent1">
+              <a:shade val="50000"/>
+            </a:schemeClr>
+          </a:lnRef>
+          <a:fillRef idx="1">
+            <a:schemeClr val="accent1"/>
+          </a:fillRef>
+          <a:effectRef idx="0">
+            <a:schemeClr val="accent1"/>
+          </a:effectRef>
+          <a:fontRef idx="minor">
+            <a:schemeClr val="lt1"/>
+          </a:fontRef>
+        </p:style>
+        <p:txBody>
+          <a:bodyPr rtlCol="0" anchor="ctr"/>
+          <a:lstStyle/>
+          <a:p>
+            <a:pPr algn="ctr"/>
+            <a:endParaRPr lang="da-DK"/>
+          </a:p>
+        </p:txBody>
+      </p:sp>
     </p:spTree>
     <p:extLst>
       <p:ext uri="{BB962C8B-B14F-4D97-AF65-F5344CB8AC3E}">
@@ -3210,6 +3298,13 @@
   <p:clrMapOvr>
     <a:masterClrMapping/>
   </p:clrMapOvr>
+  <p:timing>
+    <p:tnLst>
+      <p:par>
+        <p:cTn id="1" dur="indefinite" restart="never" nodeType="tmRoot"/>
+      </p:par>
+    </p:tnLst>
+  </p:timing>
 </p:sld>
 </file>
 
@@ -3247,11 +3342,7 @@
           <a:p>
             <a:r>
               <a:rPr lang="da-DK" b="1"/>
-              <a:t>Føj eksisterende solution til </a:t>
-            </a:r>
-            <a:r>
-              <a:rPr lang="da-DK" b="1"/>
-              <a:t>GitHub </a:t>
+              <a:t>Føj eksisterende solution til GitHub </a:t>
             </a:r>
             <a:r>
               <a:rPr lang="da-DK" b="1" smtClean="0"/>
@@ -3329,6 +3420,98 @@
           </a:prstGeom>
         </p:spPr>
       </p:pic>
+      <p:sp>
+        <p:nvSpPr>
+          <p:cNvPr id="5" name="Ellipse 4"/>
+          <p:cNvSpPr/>
+          <p:nvPr/>
+        </p:nvSpPr>
+        <p:spPr>
+          <a:xfrm>
+            <a:off x="6798623" y="3920705"/>
+            <a:ext cx="1606164" cy="563832"/>
+          </a:xfrm>
+          <a:prstGeom prst="ellipse">
+            <a:avLst/>
+          </a:prstGeom>
+          <a:noFill/>
+          <a:ln w="76200">
+            <a:solidFill>
+              <a:srgbClr val="FF0000"/>
+            </a:solidFill>
+          </a:ln>
+        </p:spPr>
+        <p:style>
+          <a:lnRef idx="2">
+            <a:schemeClr val="accent1">
+              <a:shade val="50000"/>
+            </a:schemeClr>
+          </a:lnRef>
+          <a:fillRef idx="1">
+            <a:schemeClr val="accent1"/>
+          </a:fillRef>
+          <a:effectRef idx="0">
+            <a:schemeClr val="accent1"/>
+          </a:effectRef>
+          <a:fontRef idx="minor">
+            <a:schemeClr val="lt1"/>
+          </a:fontRef>
+        </p:style>
+        <p:txBody>
+          <a:bodyPr rtlCol="0" anchor="ctr"/>
+          <a:lstStyle/>
+          <a:p>
+            <a:pPr algn="ctr"/>
+            <a:endParaRPr lang="da-DK"/>
+          </a:p>
+        </p:txBody>
+      </p:sp>
+      <p:sp>
+        <p:nvSpPr>
+          <p:cNvPr id="6" name="Ellipse 5"/>
+          <p:cNvSpPr/>
+          <p:nvPr/>
+        </p:nvSpPr>
+        <p:spPr>
+          <a:xfrm>
+            <a:off x="6599840" y="4651865"/>
+            <a:ext cx="1311708" cy="467736"/>
+          </a:xfrm>
+          <a:prstGeom prst="ellipse">
+            <a:avLst/>
+          </a:prstGeom>
+          <a:noFill/>
+          <a:ln w="76200">
+            <a:solidFill>
+              <a:srgbClr val="FF0000"/>
+            </a:solidFill>
+          </a:ln>
+        </p:spPr>
+        <p:style>
+          <a:lnRef idx="2">
+            <a:schemeClr val="accent1">
+              <a:shade val="50000"/>
+            </a:schemeClr>
+          </a:lnRef>
+          <a:fillRef idx="1">
+            <a:schemeClr val="accent1"/>
+          </a:fillRef>
+          <a:effectRef idx="0">
+            <a:schemeClr val="accent1"/>
+          </a:effectRef>
+          <a:fontRef idx="minor">
+            <a:schemeClr val="lt1"/>
+          </a:fontRef>
+        </p:style>
+        <p:txBody>
+          <a:bodyPr rtlCol="0" anchor="ctr"/>
+          <a:lstStyle/>
+          <a:p>
+            <a:pPr algn="ctr"/>
+            <a:endParaRPr lang="da-DK"/>
+          </a:p>
+        </p:txBody>
+      </p:sp>
     </p:spTree>
     <p:extLst>
       <p:ext uri="{BB962C8B-B14F-4D97-AF65-F5344CB8AC3E}">
@@ -3339,6 +3522,13 @@
   <p:clrMapOvr>
     <a:masterClrMapping/>
   </p:clrMapOvr>
+  <p:timing>
+    <p:tnLst>
+      <p:par>
+        <p:cTn id="1" dur="indefinite" restart="never" nodeType="tmRoot"/>
+      </p:par>
+    </p:tnLst>
+  </p:timing>
 </p:sld>
 </file>
 
@@ -3383,6 +3573,52 @@
           </a:prstGeom>
         </p:spPr>
       </p:pic>
+      <p:sp>
+        <p:nvSpPr>
+          <p:cNvPr id="3" name="Ellipse 2"/>
+          <p:cNvSpPr/>
+          <p:nvPr/>
+        </p:nvSpPr>
+        <p:spPr>
+          <a:xfrm>
+            <a:off x="1622065" y="1567119"/>
+            <a:ext cx="4381169" cy="1533890"/>
+          </a:xfrm>
+          <a:prstGeom prst="ellipse">
+            <a:avLst/>
+          </a:prstGeom>
+          <a:noFill/>
+          <a:ln w="76200">
+            <a:solidFill>
+              <a:srgbClr val="FF0000"/>
+            </a:solidFill>
+          </a:ln>
+        </p:spPr>
+        <p:style>
+          <a:lnRef idx="2">
+            <a:schemeClr val="accent1">
+              <a:shade val="50000"/>
+            </a:schemeClr>
+          </a:lnRef>
+          <a:fillRef idx="1">
+            <a:schemeClr val="accent1"/>
+          </a:fillRef>
+          <a:effectRef idx="0">
+            <a:schemeClr val="accent1"/>
+          </a:effectRef>
+          <a:fontRef idx="minor">
+            <a:schemeClr val="lt1"/>
+          </a:fontRef>
+        </p:style>
+        <p:txBody>
+          <a:bodyPr rtlCol="0" anchor="ctr"/>
+          <a:lstStyle/>
+          <a:p>
+            <a:pPr algn="ctr"/>
+            <a:endParaRPr lang="da-DK"/>
+          </a:p>
+        </p:txBody>
+      </p:sp>
     </p:spTree>
     <p:extLst>
       <p:ext uri="{BB962C8B-B14F-4D97-AF65-F5344CB8AC3E}">
@@ -3393,6 +3629,13 @@
   <p:clrMapOvr>
     <a:masterClrMapping/>
   </p:clrMapOvr>
+  <p:timing>
+    <p:tnLst>
+      <p:par>
+        <p:cTn id="1" dur="indefinite" restart="never" nodeType="tmRoot"/>
+      </p:par>
+    </p:tnLst>
+  </p:timing>
 </p:sld>
 </file>
 
@@ -3437,6 +3680,52 @@
           </a:prstGeom>
         </p:spPr>
       </p:pic>
+      <p:sp>
+        <p:nvSpPr>
+          <p:cNvPr id="3" name="Ellipse 2"/>
+          <p:cNvSpPr/>
+          <p:nvPr/>
+        </p:nvSpPr>
+        <p:spPr>
+          <a:xfrm>
+            <a:off x="3275938" y="2735216"/>
+            <a:ext cx="2464904" cy="858029"/>
+          </a:xfrm>
+          <a:prstGeom prst="ellipse">
+            <a:avLst/>
+          </a:prstGeom>
+          <a:noFill/>
+          <a:ln w="76200">
+            <a:solidFill>
+              <a:srgbClr val="FF0000"/>
+            </a:solidFill>
+          </a:ln>
+        </p:spPr>
+        <p:style>
+          <a:lnRef idx="2">
+            <a:schemeClr val="accent1">
+              <a:shade val="50000"/>
+            </a:schemeClr>
+          </a:lnRef>
+          <a:fillRef idx="1">
+            <a:schemeClr val="accent1"/>
+          </a:fillRef>
+          <a:effectRef idx="0">
+            <a:schemeClr val="accent1"/>
+          </a:effectRef>
+          <a:fontRef idx="minor">
+            <a:schemeClr val="lt1"/>
+          </a:fontRef>
+        </p:style>
+        <p:txBody>
+          <a:bodyPr rtlCol="0" anchor="ctr"/>
+          <a:lstStyle/>
+          <a:p>
+            <a:pPr algn="ctr"/>
+            <a:endParaRPr lang="da-DK"/>
+          </a:p>
+        </p:txBody>
+      </p:sp>
     </p:spTree>
     <p:extLst>
       <p:ext uri="{BB962C8B-B14F-4D97-AF65-F5344CB8AC3E}">
@@ -3447,6 +3736,13 @@
   <p:clrMapOvr>
     <a:masterClrMapping/>
   </p:clrMapOvr>
+  <p:timing>
+    <p:tnLst>
+      <p:par>
+        <p:cTn id="1" dur="indefinite" restart="never" nodeType="tmRoot"/>
+      </p:par>
+    </p:tnLst>
+  </p:timing>
 </p:sld>
 </file>
 
@@ -4113,6 +4409,13 @@
   <p:clrMapOvr>
     <a:masterClrMapping/>
   </p:clrMapOvr>
+  <p:timing>
+    <p:tnLst>
+      <p:par>
+        <p:cTn id="1" dur="indefinite" restart="never" nodeType="tmRoot"/>
+      </p:par>
+    </p:tnLst>
+  </p:timing>
 </p:sld>
 </file>
 
@@ -4829,6 +5132,25 @@
   <p:clrMapOvr>
     <a:masterClrMapping/>
   </p:clrMapOvr>
+  <mc:AlternateContent xmlns:mc="http://schemas.openxmlformats.org/markup-compatibility/2006">
+    <mc:Choice xmlns:p14="http://schemas.microsoft.com/office/powerpoint/2010/main" Requires="p14">
+      <p:transition spd="med" p14:dur="700">
+        <p:fade/>
+      </p:transition>
+    </mc:Choice>
+    <mc:Fallback>
+      <p:transition spd="med">
+        <p:fade/>
+      </p:transition>
+    </mc:Fallback>
+  </mc:AlternateContent>
+  <p:timing>
+    <p:tnLst>
+      <p:par>
+        <p:cTn id="1" dur="indefinite" restart="never" nodeType="tmRoot"/>
+      </p:par>
+    </p:tnLst>
+  </p:timing>
 </p:sld>
 </file>
 
@@ -4897,6 +5219,98 @@
           </a:prstGeom>
         </p:spPr>
       </p:pic>
+      <p:sp>
+        <p:nvSpPr>
+          <p:cNvPr id="6" name="Ellipse 5"/>
+          <p:cNvSpPr/>
+          <p:nvPr/>
+        </p:nvSpPr>
+        <p:spPr>
+          <a:xfrm>
+            <a:off x="834886" y="2645474"/>
+            <a:ext cx="1606164" cy="563832"/>
+          </a:xfrm>
+          <a:prstGeom prst="ellipse">
+            <a:avLst/>
+          </a:prstGeom>
+          <a:noFill/>
+          <a:ln w="76200">
+            <a:solidFill>
+              <a:srgbClr val="FF0000"/>
+            </a:solidFill>
+          </a:ln>
+        </p:spPr>
+        <p:style>
+          <a:lnRef idx="2">
+            <a:schemeClr val="accent1">
+              <a:shade val="50000"/>
+            </a:schemeClr>
+          </a:lnRef>
+          <a:fillRef idx="1">
+            <a:schemeClr val="accent1"/>
+          </a:fillRef>
+          <a:effectRef idx="0">
+            <a:schemeClr val="accent1"/>
+          </a:effectRef>
+          <a:fontRef idx="minor">
+            <a:schemeClr val="lt1"/>
+          </a:fontRef>
+        </p:style>
+        <p:txBody>
+          <a:bodyPr rtlCol="0" anchor="ctr"/>
+          <a:lstStyle/>
+          <a:p>
+            <a:pPr algn="ctr"/>
+            <a:endParaRPr lang="da-DK"/>
+          </a:p>
+        </p:txBody>
+      </p:sp>
+      <p:sp>
+        <p:nvSpPr>
+          <p:cNvPr id="7" name="Ellipse 6"/>
+          <p:cNvSpPr/>
+          <p:nvPr/>
+        </p:nvSpPr>
+        <p:spPr>
+          <a:xfrm>
+            <a:off x="6003234" y="3443627"/>
+            <a:ext cx="2067340" cy="905736"/>
+          </a:xfrm>
+          <a:prstGeom prst="ellipse">
+            <a:avLst/>
+          </a:prstGeom>
+          <a:noFill/>
+          <a:ln w="76200">
+            <a:solidFill>
+              <a:srgbClr val="FF0000"/>
+            </a:solidFill>
+          </a:ln>
+        </p:spPr>
+        <p:style>
+          <a:lnRef idx="2">
+            <a:schemeClr val="accent1">
+              <a:shade val="50000"/>
+            </a:schemeClr>
+          </a:lnRef>
+          <a:fillRef idx="1">
+            <a:schemeClr val="accent1"/>
+          </a:fillRef>
+          <a:effectRef idx="0">
+            <a:schemeClr val="accent1"/>
+          </a:effectRef>
+          <a:fontRef idx="minor">
+            <a:schemeClr val="lt1"/>
+          </a:fontRef>
+        </p:style>
+        <p:txBody>
+          <a:bodyPr rtlCol="0" anchor="ctr"/>
+          <a:lstStyle/>
+          <a:p>
+            <a:pPr algn="ctr"/>
+            <a:endParaRPr lang="da-DK"/>
+          </a:p>
+        </p:txBody>
+      </p:sp>
     </p:spTree>
     <p:extLst>
       <p:ext uri="{BB962C8B-B14F-4D97-AF65-F5344CB8AC3E}">
@@ -4907,6 +5321,13 @@
   <p:clrMapOvr>
     <a:masterClrMapping/>
   </p:clrMapOvr>
+  <p:timing>
+    <p:tnLst>
+      <p:par>
+        <p:cTn id="1" dur="indefinite" restart="never" nodeType="tmRoot"/>
+      </p:par>
+    </p:tnLst>
+  </p:timing>
 </p:sld>
 </file>
 
@@ -4961,6 +5382,13 @@
   <p:clrMapOvr>
     <a:masterClrMapping/>
   </p:clrMapOvr>
+  <p:timing>
+    <p:tnLst>
+      <p:par>
+        <p:cTn id="1" dur="indefinite" restart="never" nodeType="tmRoot"/>
+      </p:par>
+    </p:tnLst>
+  </p:timing>
 </p:sld>
 </file>
 
@@ -5131,6 +5559,13 @@
   <p:clrMapOvr>
     <a:masterClrMapping/>
   </p:clrMapOvr>
+  <p:timing>
+    <p:tnLst>
+      <p:par>
+        <p:cTn id="1" dur="indefinite" restart="never" nodeType="tmRoot"/>
+      </p:par>
+    </p:tnLst>
+  </p:timing>
 </p:sld>
 </file>
 
@@ -5175,6 +5610,98 @@
           </a:prstGeom>
         </p:spPr>
       </p:pic>
+      <p:sp>
+        <p:nvSpPr>
+          <p:cNvPr id="3" name="Ellipse 2"/>
+          <p:cNvSpPr/>
+          <p:nvPr/>
+        </p:nvSpPr>
+        <p:spPr>
+          <a:xfrm>
+            <a:off x="1144987" y="5256524"/>
+            <a:ext cx="3991556" cy="563832"/>
+          </a:xfrm>
+          <a:prstGeom prst="ellipse">
+            <a:avLst/>
+          </a:prstGeom>
+          <a:noFill/>
+          <a:ln w="76200">
+            <a:solidFill>
+              <a:srgbClr val="FF0000"/>
+            </a:solidFill>
+          </a:ln>
+        </p:spPr>
+        <p:style>
+          <a:lnRef idx="2">
+            <a:schemeClr val="accent1">
+              <a:shade val="50000"/>
+            </a:schemeClr>
+          </a:lnRef>
+          <a:fillRef idx="1">
+            <a:schemeClr val="accent1"/>
+          </a:fillRef>
+          <a:effectRef idx="0">
+            <a:schemeClr val="accent1"/>
+          </a:effectRef>
+          <a:fontRef idx="minor">
+            <a:schemeClr val="lt1"/>
+          </a:fontRef>
+        </p:style>
+        <p:txBody>
+          <a:bodyPr rtlCol="0" anchor="ctr"/>
+          <a:lstStyle/>
+          <a:p>
+            <a:pPr algn="ctr"/>
+            <a:endParaRPr lang="da-DK"/>
+          </a:p>
+        </p:txBody>
+      </p:sp>
+      <p:sp>
+        <p:nvSpPr>
+          <p:cNvPr id="6" name="Ellipse 5"/>
+          <p:cNvSpPr/>
+          <p:nvPr/>
+        </p:nvSpPr>
+        <p:spPr>
+          <a:xfrm>
+            <a:off x="999737" y="2489471"/>
+            <a:ext cx="5989459" cy="754662"/>
+          </a:xfrm>
+          <a:prstGeom prst="ellipse">
+            <a:avLst/>
+          </a:prstGeom>
+          <a:noFill/>
+          <a:ln w="76200">
+            <a:solidFill>
+              <a:srgbClr val="FF0000"/>
+            </a:solidFill>
+          </a:ln>
+        </p:spPr>
+        <p:style>
+          <a:lnRef idx="2">
+            <a:schemeClr val="accent1">
+              <a:shade val="50000"/>
+            </a:schemeClr>
+          </a:lnRef>
+          <a:fillRef idx="1">
+            <a:schemeClr val="accent1"/>
+          </a:fillRef>
+          <a:effectRef idx="0">
+            <a:schemeClr val="accent1"/>
+          </a:effectRef>
+          <a:fontRef idx="minor">
+            <a:schemeClr val="lt1"/>
+          </a:fontRef>
+        </p:style>
+        <p:txBody>
+          <a:bodyPr rtlCol="0" anchor="ctr"/>
+          <a:lstStyle/>
+          <a:p>
+            <a:pPr algn="ctr"/>
+            <a:endParaRPr lang="da-DK"/>
+          </a:p>
+        </p:txBody>
+      </p:sp>
     </p:spTree>
     <p:extLst>
       <p:ext uri="{BB962C8B-B14F-4D97-AF65-F5344CB8AC3E}">
@@ -5185,6 +5712,13 @@
   <p:clrMapOvr>
     <a:masterClrMapping/>
   </p:clrMapOvr>
+  <p:timing>
+    <p:tnLst>
+      <p:par>
+        <p:cTn id="1" dur="indefinite" restart="never" nodeType="tmRoot"/>
+      </p:par>
+    </p:tnLst>
+  </p:timing>
 </p:sld>
 </file>
 
@@ -5334,6 +5868,13 @@
   <p:clrMapOvr>
     <a:masterClrMapping/>
   </p:clrMapOvr>
+  <p:timing>
+    <p:tnLst>
+      <p:par>
+        <p:cTn id="1" dur="indefinite" restart="never" nodeType="tmRoot"/>
+      </p:par>
+    </p:tnLst>
+  </p:timing>
 </p:sld>
 </file>
 
@@ -5378,6 +5919,52 @@
           </a:prstGeom>
         </p:spPr>
       </p:pic>
+      <p:sp>
+        <p:nvSpPr>
+          <p:cNvPr id="3" name="Ellipse 2"/>
+          <p:cNvSpPr/>
+          <p:nvPr/>
+        </p:nvSpPr>
+        <p:spPr>
+          <a:xfrm>
+            <a:off x="1685675" y="1893122"/>
+            <a:ext cx="6989198" cy="770564"/>
+          </a:xfrm>
+          <a:prstGeom prst="ellipse">
+            <a:avLst/>
+          </a:prstGeom>
+          <a:noFill/>
+          <a:ln w="76200">
+            <a:solidFill>
+              <a:srgbClr val="FF0000"/>
+            </a:solidFill>
+          </a:ln>
+        </p:spPr>
+        <p:style>
+          <a:lnRef idx="2">
+            <a:schemeClr val="accent1">
+              <a:shade val="50000"/>
+            </a:schemeClr>
+          </a:lnRef>
+          <a:fillRef idx="1">
+            <a:schemeClr val="accent1"/>
+          </a:fillRef>
+          <a:effectRef idx="0">
+            <a:schemeClr val="accent1"/>
+          </a:effectRef>
+          <a:fontRef idx="minor">
+            <a:schemeClr val="lt1"/>
+          </a:fontRef>
+        </p:style>
+        <p:txBody>
+          <a:bodyPr rtlCol="0" anchor="ctr"/>
+          <a:lstStyle/>
+          <a:p>
+            <a:pPr algn="ctr"/>
+            <a:endParaRPr lang="da-DK"/>
+          </a:p>
+        </p:txBody>
+      </p:sp>
     </p:spTree>
     <p:extLst>
       <p:ext uri="{BB962C8B-B14F-4D97-AF65-F5344CB8AC3E}">
@@ -5388,6 +5975,13 @@
   <p:clrMapOvr>
     <a:masterClrMapping/>
   </p:clrMapOvr>
+  <p:timing>
+    <p:tnLst>
+      <p:par>
+        <p:cTn id="1" dur="indefinite" restart="never" nodeType="tmRoot"/>
+      </p:par>
+    </p:tnLst>
+  </p:timing>
 </p:sld>
 </file>
 
@@ -5432,6 +6026,52 @@
           </a:prstGeom>
         </p:spPr>
       </p:pic>
+      <p:sp>
+        <p:nvSpPr>
+          <p:cNvPr id="3" name="Ellipse 2"/>
+          <p:cNvSpPr/>
+          <p:nvPr/>
+        </p:nvSpPr>
+        <p:spPr>
+          <a:xfrm>
+            <a:off x="3395206" y="4095634"/>
+            <a:ext cx="3991556" cy="563832"/>
+          </a:xfrm>
+          <a:prstGeom prst="ellipse">
+            <a:avLst/>
+          </a:prstGeom>
+          <a:noFill/>
+          <a:ln w="76200">
+            <a:solidFill>
+              <a:srgbClr val="FF0000"/>
+            </a:solidFill>
+          </a:ln>
+        </p:spPr>
+        <p:style>
+          <a:lnRef idx="2">
+            <a:schemeClr val="accent1">
+              <a:shade val="50000"/>
+            </a:schemeClr>
+          </a:lnRef>
+          <a:fillRef idx="1">
+            <a:schemeClr val="accent1"/>
+          </a:fillRef>
+          <a:effectRef idx="0">
+            <a:schemeClr val="accent1"/>
+          </a:effectRef>
+          <a:fontRef idx="minor">
+            <a:schemeClr val="lt1"/>
+          </a:fontRef>
+        </p:style>
+        <p:txBody>
+          <a:bodyPr rtlCol="0" anchor="ctr"/>
+          <a:lstStyle/>
+          <a:p>
+            <a:pPr algn="ctr"/>
+            <a:endParaRPr lang="da-DK"/>
+          </a:p>
+        </p:txBody>
+      </p:sp>
     </p:spTree>
     <p:extLst>
       <p:ext uri="{BB962C8B-B14F-4D97-AF65-F5344CB8AC3E}">
@@ -5442,6 +6082,13 @@
   <p:clrMapOvr>
     <a:masterClrMapping/>
   </p:clrMapOvr>
+  <p:timing>
+    <p:tnLst>
+      <p:par>
+        <p:cTn id="1" dur="indefinite" restart="never" nodeType="tmRoot"/>
+      </p:par>
+    </p:tnLst>
+  </p:timing>
 </p:sld>
 </file>
 
@@ -5577,6 +6224,52 @@
           </a:prstGeom>
         </p:spPr>
       </p:pic>
+      <p:sp>
+        <p:nvSpPr>
+          <p:cNvPr id="5" name="Ellipse 4"/>
+          <p:cNvSpPr/>
+          <p:nvPr/>
+        </p:nvSpPr>
+        <p:spPr>
+          <a:xfrm>
+            <a:off x="6368994" y="4916953"/>
+            <a:ext cx="1709531" cy="563832"/>
+          </a:xfrm>
+          <a:prstGeom prst="ellipse">
+            <a:avLst/>
+          </a:prstGeom>
+          <a:noFill/>
+          <a:ln w="76200">
+            <a:solidFill>
+              <a:srgbClr val="FF0000"/>
+            </a:solidFill>
+          </a:ln>
+        </p:spPr>
+        <p:style>
+          <a:lnRef idx="2">
+            <a:schemeClr val="accent1">
+              <a:shade val="50000"/>
+            </a:schemeClr>
+          </a:lnRef>
+          <a:fillRef idx="1">
+            <a:schemeClr val="accent1"/>
+          </a:fillRef>
+          <a:effectRef idx="0">
+            <a:schemeClr val="accent1"/>
+          </a:effectRef>
+          <a:fontRef idx="minor">
+            <a:schemeClr val="lt1"/>
+          </a:fontRef>
+        </p:style>
+        <p:txBody>
+          <a:bodyPr rtlCol="0" anchor="ctr"/>
+          <a:lstStyle/>
+          <a:p>
+            <a:pPr algn="ctr"/>
+            <a:endParaRPr lang="da-DK"/>
+          </a:p>
+        </p:txBody>
+      </p:sp>
     </p:spTree>
     <p:extLst>
       <p:ext uri="{BB962C8B-B14F-4D97-AF65-F5344CB8AC3E}">
@@ -5587,6 +6280,13 @@
   <p:clrMapOvr>
     <a:masterClrMapping/>
   </p:clrMapOvr>
+  <p:timing>
+    <p:tnLst>
+      <p:par>
+        <p:cTn id="1" dur="indefinite" restart="never" nodeType="tmRoot"/>
+      </p:par>
+    </p:tnLst>
+  </p:timing>
 </p:sld>
 </file>
 
@@ -5641,6 +6341,13 @@
   <p:clrMapOvr>
     <a:masterClrMapping/>
   </p:clrMapOvr>
+  <p:timing>
+    <p:tnLst>
+      <p:par>
+        <p:cTn id="1" dur="indefinite" restart="never" nodeType="tmRoot"/>
+      </p:par>
+    </p:tnLst>
+  </p:timing>
 </p:sld>
 </file>
 
@@ -5719,6 +6426,13 @@
   <p:clrMapOvr>
     <a:masterClrMapping/>
   </p:clrMapOvr>
+  <p:timing>
+    <p:tnLst>
+      <p:par>
+        <p:cTn id="1" dur="indefinite" restart="never" nodeType="tmRoot"/>
+      </p:par>
+    </p:tnLst>
+  </p:timing>
 </p:sld>
 </file>
 
@@ -5773,6 +6487,13 @@
   <p:clrMapOvr>
     <a:masterClrMapping/>
   </p:clrMapOvr>
+  <p:timing>
+    <p:tnLst>
+      <p:par>
+        <p:cTn id="1" dur="indefinite" restart="never" nodeType="tmRoot"/>
+      </p:par>
+    </p:tnLst>
+  </p:timing>
 </p:sld>
 </file>
 
@@ -5827,6 +6548,13 @@
   <p:clrMapOvr>
     <a:masterClrMapping/>
   </p:clrMapOvr>
+  <p:timing>
+    <p:tnLst>
+      <p:par>
+        <p:cTn id="1" dur="indefinite" restart="never" nodeType="tmRoot"/>
+      </p:par>
+    </p:tnLst>
+  </p:timing>
 </p:sld>
 </file>
 
@@ -5952,6 +6680,13 @@
   <p:clrMapOvr>
     <a:masterClrMapping/>
   </p:clrMapOvr>
+  <p:timing>
+    <p:tnLst>
+      <p:par>
+        <p:cTn id="1" dur="indefinite" restart="never" nodeType="tmRoot"/>
+      </p:par>
+    </p:tnLst>
+  </p:timing>
 </p:sld>
 </file>
 
@@ -6020,6 +6755,52 @@
           </a:prstGeom>
         </p:spPr>
       </p:pic>
+      <p:sp>
+        <p:nvSpPr>
+          <p:cNvPr id="6" name="Ellipse 5"/>
+          <p:cNvSpPr/>
+          <p:nvPr/>
+        </p:nvSpPr>
+        <p:spPr>
+          <a:xfrm>
+            <a:off x="6623436" y="3483383"/>
+            <a:ext cx="1574359" cy="826224"/>
+          </a:xfrm>
+          <a:prstGeom prst="ellipse">
+            <a:avLst/>
+          </a:prstGeom>
+          <a:noFill/>
+          <a:ln w="76200">
+            <a:solidFill>
+              <a:srgbClr val="FF0000"/>
+            </a:solidFill>
+          </a:ln>
+        </p:spPr>
+        <p:style>
+          <a:lnRef idx="2">
+            <a:schemeClr val="accent1">
+              <a:shade val="50000"/>
+            </a:schemeClr>
+          </a:lnRef>
+          <a:fillRef idx="1">
+            <a:schemeClr val="accent1"/>
+          </a:fillRef>
+          <a:effectRef idx="0">
+            <a:schemeClr val="accent1"/>
+          </a:effectRef>
+          <a:fontRef idx="minor">
+            <a:schemeClr val="lt1"/>
+          </a:fontRef>
+        </p:style>
+        <p:txBody>
+          <a:bodyPr rtlCol="0" anchor="ctr"/>
+          <a:lstStyle/>
+          <a:p>
+            <a:pPr algn="ctr"/>
+            <a:endParaRPr lang="da-DK"/>
+          </a:p>
+        </p:txBody>
+      </p:sp>
     </p:spTree>
     <p:extLst>
       <p:ext uri="{BB962C8B-B14F-4D97-AF65-F5344CB8AC3E}">
@@ -6030,6 +6811,13 @@
   <p:clrMapOvr>
     <a:masterClrMapping/>
   </p:clrMapOvr>
+  <p:timing>
+    <p:tnLst>
+      <p:par>
+        <p:cTn id="1" dur="indefinite" restart="never" nodeType="tmRoot"/>
+      </p:par>
+    </p:tnLst>
+  </p:timing>
 </p:sld>
 </file>
 
@@ -6098,6 +6886,98 @@
           </a:prstGeom>
         </p:spPr>
       </p:pic>
+      <p:sp>
+        <p:nvSpPr>
+          <p:cNvPr id="4" name="Ellipse 3"/>
+          <p:cNvSpPr/>
+          <p:nvPr/>
+        </p:nvSpPr>
+        <p:spPr>
+          <a:xfrm>
+            <a:off x="155215" y="2179369"/>
+            <a:ext cx="3717070" cy="730808"/>
+          </a:xfrm>
+          <a:prstGeom prst="ellipse">
+            <a:avLst/>
+          </a:prstGeom>
+          <a:noFill/>
+          <a:ln w="76200">
+            <a:solidFill>
+              <a:srgbClr val="FF0000"/>
+            </a:solidFill>
+          </a:ln>
+        </p:spPr>
+        <p:style>
+          <a:lnRef idx="2">
+            <a:schemeClr val="accent1">
+              <a:shade val="50000"/>
+            </a:schemeClr>
+          </a:lnRef>
+          <a:fillRef idx="1">
+            <a:schemeClr val="accent1"/>
+          </a:fillRef>
+          <a:effectRef idx="0">
+            <a:schemeClr val="accent1"/>
+          </a:effectRef>
+          <a:fontRef idx="minor">
+            <a:schemeClr val="lt1"/>
+          </a:fontRef>
+        </p:style>
+        <p:txBody>
+          <a:bodyPr rtlCol="0" anchor="ctr"/>
+          <a:lstStyle/>
+          <a:p>
+            <a:pPr algn="ctr"/>
+            <a:endParaRPr lang="da-DK"/>
+          </a:p>
+        </p:txBody>
+      </p:sp>
+      <p:sp>
+        <p:nvSpPr>
+          <p:cNvPr id="5" name="Ellipse 4"/>
+          <p:cNvSpPr/>
+          <p:nvPr/>
+        </p:nvSpPr>
+        <p:spPr>
+          <a:xfrm>
+            <a:off x="4874150" y="3037398"/>
+            <a:ext cx="2600076" cy="1097281"/>
+          </a:xfrm>
+          <a:prstGeom prst="ellipse">
+            <a:avLst/>
+          </a:prstGeom>
+          <a:noFill/>
+          <a:ln w="76200">
+            <a:solidFill>
+              <a:srgbClr val="FF0000"/>
+            </a:solidFill>
+          </a:ln>
+        </p:spPr>
+        <p:style>
+          <a:lnRef idx="2">
+            <a:schemeClr val="accent1">
+              <a:shade val="50000"/>
+            </a:schemeClr>
+          </a:lnRef>
+          <a:fillRef idx="1">
+            <a:schemeClr val="accent1"/>
+          </a:fillRef>
+          <a:effectRef idx="0">
+            <a:schemeClr val="accent1"/>
+          </a:effectRef>
+          <a:fontRef idx="minor">
+            <a:schemeClr val="lt1"/>
+          </a:fontRef>
+        </p:style>
+        <p:txBody>
+          <a:bodyPr rtlCol="0" anchor="ctr"/>
+          <a:lstStyle/>
+          <a:p>
+            <a:pPr algn="ctr"/>
+            <a:endParaRPr lang="da-DK"/>
+          </a:p>
+        </p:txBody>
+      </p:sp>
     </p:spTree>
     <p:extLst>
       <p:ext uri="{BB962C8B-B14F-4D97-AF65-F5344CB8AC3E}">
@@ -6108,6 +6988,13 @@
   <p:clrMapOvr>
     <a:masterClrMapping/>
   </p:clrMapOvr>
+  <p:timing>
+    <p:tnLst>
+      <p:par>
+        <p:cTn id="1" dur="indefinite" restart="never" nodeType="tmRoot"/>
+      </p:par>
+    </p:tnLst>
+  </p:timing>
 </p:sld>
 </file>
 
@@ -6249,6 +7136,13 @@
   <p:clrMapOvr>
     <a:masterClrMapping/>
   </p:clrMapOvr>
+  <p:timing>
+    <p:tnLst>
+      <p:par>
+        <p:cTn id="1" dur="indefinite" restart="never" nodeType="tmRoot"/>
+      </p:par>
+    </p:tnLst>
+  </p:timing>
 </p:sld>
 </file>
 
@@ -6402,6 +7296,52 @@
           </a:prstGeom>
         </p:spPr>
       </p:pic>
+      <p:sp>
+        <p:nvSpPr>
+          <p:cNvPr id="6" name="Ellipse 5"/>
+          <p:cNvSpPr/>
+          <p:nvPr/>
+        </p:nvSpPr>
+        <p:spPr>
+          <a:xfrm>
+            <a:off x="7108465" y="3387967"/>
+            <a:ext cx="1256307" cy="563832"/>
+          </a:xfrm>
+          <a:prstGeom prst="ellipse">
+            <a:avLst/>
+          </a:prstGeom>
+          <a:noFill/>
+          <a:ln w="76200">
+            <a:solidFill>
+              <a:srgbClr val="FF0000"/>
+            </a:solidFill>
+          </a:ln>
+        </p:spPr>
+        <p:style>
+          <a:lnRef idx="2">
+            <a:schemeClr val="accent1">
+              <a:shade val="50000"/>
+            </a:schemeClr>
+          </a:lnRef>
+          <a:fillRef idx="1">
+            <a:schemeClr val="accent1"/>
+          </a:fillRef>
+          <a:effectRef idx="0">
+            <a:schemeClr val="accent1"/>
+          </a:effectRef>
+          <a:fontRef idx="minor">
+            <a:schemeClr val="lt1"/>
+          </a:fontRef>
+        </p:style>
+        <p:txBody>
+          <a:bodyPr rtlCol="0" anchor="ctr"/>
+          <a:lstStyle/>
+          <a:p>
+            <a:pPr algn="ctr"/>
+            <a:endParaRPr lang="da-DK"/>
+          </a:p>
+        </p:txBody>
+      </p:sp>
     </p:spTree>
     <p:extLst>
       <p:ext uri="{BB962C8B-B14F-4D97-AF65-F5344CB8AC3E}">
@@ -6412,6 +7352,13 @@
   <p:clrMapOvr>
     <a:masterClrMapping/>
   </p:clrMapOvr>
+  <p:timing>
+    <p:tnLst>
+      <p:par>
+        <p:cTn id="1" dur="indefinite" restart="never" nodeType="tmRoot"/>
+      </p:par>
+    </p:tnLst>
+  </p:timing>
 </p:sld>
 </file>
 
@@ -6504,6 +7451,144 @@
           </a:prstGeom>
         </p:spPr>
       </p:pic>
+      <p:sp>
+        <p:nvSpPr>
+          <p:cNvPr id="5" name="Ellipse 4"/>
+          <p:cNvSpPr/>
+          <p:nvPr/>
+        </p:nvSpPr>
+        <p:spPr>
+          <a:xfrm>
+            <a:off x="373084" y="1495557"/>
+            <a:ext cx="1152940" cy="563832"/>
+          </a:xfrm>
+          <a:prstGeom prst="ellipse">
+            <a:avLst/>
+          </a:prstGeom>
+          <a:noFill/>
+          <a:ln w="76200">
+            <a:solidFill>
+              <a:srgbClr val="FF0000"/>
+            </a:solidFill>
+          </a:ln>
+        </p:spPr>
+        <p:style>
+          <a:lnRef idx="2">
+            <a:schemeClr val="accent1">
+              <a:shade val="50000"/>
+            </a:schemeClr>
+          </a:lnRef>
+          <a:fillRef idx="1">
+            <a:schemeClr val="accent1"/>
+          </a:fillRef>
+          <a:effectRef idx="0">
+            <a:schemeClr val="accent1"/>
+          </a:effectRef>
+          <a:fontRef idx="minor">
+            <a:schemeClr val="lt1"/>
+          </a:fontRef>
+        </p:style>
+        <p:txBody>
+          <a:bodyPr rtlCol="0" anchor="ctr"/>
+          <a:lstStyle/>
+          <a:p>
+            <a:pPr algn="ctr"/>
+            <a:endParaRPr lang="da-DK"/>
+          </a:p>
+        </p:txBody>
+      </p:sp>
+      <p:sp>
+        <p:nvSpPr>
+          <p:cNvPr id="8" name="Ellipse 7"/>
+          <p:cNvSpPr/>
+          <p:nvPr/>
+        </p:nvSpPr>
+        <p:spPr>
+          <a:xfrm>
+            <a:off x="4278500" y="1777473"/>
+            <a:ext cx="1152940" cy="563832"/>
+          </a:xfrm>
+          <a:prstGeom prst="ellipse">
+            <a:avLst/>
+          </a:prstGeom>
+          <a:noFill/>
+          <a:ln w="76200">
+            <a:solidFill>
+              <a:srgbClr val="FF0000"/>
+            </a:solidFill>
+          </a:ln>
+        </p:spPr>
+        <p:style>
+          <a:lnRef idx="2">
+            <a:schemeClr val="accent1">
+              <a:shade val="50000"/>
+            </a:schemeClr>
+          </a:lnRef>
+          <a:fillRef idx="1">
+            <a:schemeClr val="accent1"/>
+          </a:fillRef>
+          <a:effectRef idx="0">
+            <a:schemeClr val="accent1"/>
+          </a:effectRef>
+          <a:fontRef idx="minor">
+            <a:schemeClr val="lt1"/>
+          </a:fontRef>
+        </p:style>
+        <p:txBody>
+          <a:bodyPr rtlCol="0" anchor="ctr"/>
+          <a:lstStyle/>
+          <a:p>
+            <a:pPr algn="ctr"/>
+            <a:endParaRPr lang="da-DK"/>
+          </a:p>
+        </p:txBody>
+      </p:sp>
+      <p:sp>
+        <p:nvSpPr>
+          <p:cNvPr id="9" name="Ellipse 8"/>
+          <p:cNvSpPr/>
+          <p:nvPr/>
+        </p:nvSpPr>
+        <p:spPr>
+          <a:xfrm>
+            <a:off x="8938980" y="4009495"/>
+            <a:ext cx="1152940" cy="563832"/>
+          </a:xfrm>
+          <a:prstGeom prst="ellipse">
+            <a:avLst/>
+          </a:prstGeom>
+          <a:noFill/>
+          <a:ln w="76200">
+            <a:solidFill>
+              <a:srgbClr val="FF0000"/>
+            </a:solidFill>
+          </a:ln>
+        </p:spPr>
+        <p:style>
+          <a:lnRef idx="2">
+            <a:schemeClr val="accent1">
+              <a:shade val="50000"/>
+            </a:schemeClr>
+          </a:lnRef>
+          <a:fillRef idx="1">
+            <a:schemeClr val="accent1"/>
+          </a:fillRef>
+          <a:effectRef idx="0">
+            <a:schemeClr val="accent1"/>
+          </a:effectRef>
+          <a:fontRef idx="minor">
+            <a:schemeClr val="lt1"/>
+          </a:fontRef>
+        </p:style>
+        <p:txBody>
+          <a:bodyPr rtlCol="0" anchor="ctr"/>
+          <a:lstStyle/>
+          <a:p>
+            <a:pPr algn="ctr"/>
+            <a:endParaRPr lang="da-DK"/>
+          </a:p>
+        </p:txBody>
+      </p:sp>
     </p:spTree>
     <p:extLst>
       <p:ext uri="{BB962C8B-B14F-4D97-AF65-F5344CB8AC3E}">
@@ -6514,6 +7599,13 @@
   <p:clrMapOvr>
     <a:masterClrMapping/>
   </p:clrMapOvr>
+  <p:timing>
+    <p:tnLst>
+      <p:par>
+        <p:cTn id="1" dur="indefinite" restart="never" nodeType="tmRoot"/>
+      </p:par>
+    </p:tnLst>
+  </p:timing>
 </p:sld>
 </file>
 
@@ -6729,6 +7821,13 @@
   <p:clrMapOvr>
     <a:masterClrMapping/>
   </p:clrMapOvr>
+  <p:timing>
+    <p:tnLst>
+      <p:par>
+        <p:cTn id="1" dur="indefinite" restart="never" nodeType="tmRoot"/>
+      </p:par>
+    </p:tnLst>
+  </p:timing>
 </p:sld>
 </file>
 
@@ -6890,7 +7989,6 @@
               <a:rPr lang="da-DK" sz="2400" i="1" smtClean="0"/>
               <a:t>solution</a:t>
             </a:r>
-            <a:endParaRPr lang="da-DK" sz="2400" i="1" smtClean="0"/>
           </a:p>
           <a:p>
             <a:endParaRPr lang="da-DK" sz="2400"/>
@@ -6989,13 +8087,8 @@
             <a:pPr algn="r"/>
             <a:r>
               <a:rPr lang="da-DK" sz="1400" smtClean="0"/>
-              <a:t>Gruppens C# </a:t>
-            </a:r>
-            <a:r>
-              <a:rPr lang="da-DK" sz="1400" smtClean="0"/>
-              <a:t>solution</a:t>
-            </a:r>
-            <a:endParaRPr lang="da-DK" sz="1400" smtClean="0"/>
+              <a:t>Gruppens C# solution</a:t>
+            </a:r>
           </a:p>
         </p:txBody>
       </p:sp>
@@ -7037,13 +8130,8 @@
             <a:pPr algn="r"/>
             <a:r>
               <a:rPr lang="da-DK" sz="1400" smtClean="0"/>
-              <a:t>Gruppens C# </a:t>
-            </a:r>
-            <a:r>
-              <a:rPr lang="da-DK" sz="1400" smtClean="0"/>
-              <a:t>solution</a:t>
-            </a:r>
-            <a:endParaRPr lang="da-DK" sz="1400" smtClean="0"/>
+              <a:t>Gruppens C# solution</a:t>
+            </a:r>
           </a:p>
         </p:txBody>
       </p:sp>
@@ -7085,13 +8173,8 @@
             <a:pPr algn="r"/>
             <a:r>
               <a:rPr lang="da-DK" sz="1400" smtClean="0"/>
-              <a:t>Gruppens C# </a:t>
-            </a:r>
-            <a:r>
-              <a:rPr lang="da-DK" sz="1400" smtClean="0"/>
-              <a:t>solution</a:t>
-            </a:r>
-            <a:endParaRPr lang="da-DK" sz="1400" smtClean="0"/>
+              <a:t>Gruppens C# solution</a:t>
+            </a:r>
           </a:p>
         </p:txBody>
       </p:sp>
@@ -7450,13 +8533,8 @@
             <a:pPr algn="r"/>
             <a:r>
               <a:rPr lang="da-DK" sz="1400" smtClean="0"/>
-              <a:t>Gruppens C# </a:t>
-            </a:r>
-            <a:r>
-              <a:rPr lang="da-DK" sz="1400" smtClean="0"/>
-              <a:t>solution</a:t>
-            </a:r>
-            <a:endParaRPr lang="da-DK" sz="1400" smtClean="0"/>
+              <a:t>Gruppens C# solution</a:t>
+            </a:r>
           </a:p>
         </p:txBody>
       </p:sp>
@@ -7503,13 +8581,8 @@
             <a:pPr algn="r"/>
             <a:r>
               <a:rPr lang="da-DK" sz="1400" smtClean="0"/>
-              <a:t>Gruppens C# </a:t>
-            </a:r>
-            <a:r>
-              <a:rPr lang="da-DK" sz="1400" smtClean="0"/>
-              <a:t>solution</a:t>
-            </a:r>
-            <a:endParaRPr lang="da-DK" sz="1400" smtClean="0"/>
+              <a:t>Gruppens C# solution</a:t>
+            </a:r>
           </a:p>
         </p:txBody>
       </p:sp>
@@ -7557,13 +8630,8 @@
             <a:pPr algn="r"/>
             <a:r>
               <a:rPr lang="da-DK" sz="1400" smtClean="0"/>
-              <a:t>Gruppens C# </a:t>
-            </a:r>
-            <a:r>
-              <a:rPr lang="da-DK" sz="1400" smtClean="0"/>
-              <a:t>solution</a:t>
-            </a:r>
-            <a:endParaRPr lang="da-DK" sz="1400" smtClean="0"/>
+              <a:t>Gruppens C# solution</a:t>
+            </a:r>
           </a:p>
         </p:txBody>
       </p:sp>
@@ -7577,6 +8645,18 @@
   <p:clrMapOvr>
     <a:masterClrMapping/>
   </p:clrMapOvr>
+  <mc:AlternateContent xmlns:mc="http://schemas.openxmlformats.org/markup-compatibility/2006">
+    <mc:Choice xmlns:p14="http://schemas.microsoft.com/office/powerpoint/2010/main" Requires="p14">
+      <p:transition spd="med" p14:dur="700">
+        <p:fade/>
+      </p:transition>
+    </mc:Choice>
+    <mc:Fallback>
+      <p:transition spd="med">
+        <p:fade/>
+      </p:transition>
+    </mc:Fallback>
+  </mc:AlternateContent>
   <p:timing>
     <p:tnLst>
       <p:par>
@@ -7761,7 +8841,6 @@
               <a:rPr lang="da-DK" sz="2400" smtClean="0"/>
               <a:t> uden konflikter, men det er ens eget ansvar!</a:t>
             </a:r>
-            <a:endParaRPr lang="da-DK" sz="2400" smtClean="0"/>
           </a:p>
         </p:txBody>
       </p:sp>
@@ -7857,13 +8936,8 @@
             <a:pPr algn="r"/>
             <a:r>
               <a:rPr lang="da-DK" sz="1400" smtClean="0"/>
-              <a:t>Gruppens C# </a:t>
-            </a:r>
-            <a:r>
-              <a:rPr lang="da-DK" sz="1400" smtClean="0"/>
-              <a:t>solution</a:t>
-            </a:r>
-            <a:endParaRPr lang="da-DK" sz="1400" smtClean="0"/>
+              <a:t>Gruppens C# solution</a:t>
+            </a:r>
           </a:p>
         </p:txBody>
       </p:sp>
@@ -7910,13 +8984,8 @@
             <a:pPr algn="r"/>
             <a:r>
               <a:rPr lang="da-DK" sz="1400" smtClean="0"/>
-              <a:t>Gruppens C# </a:t>
-            </a:r>
-            <a:r>
-              <a:rPr lang="da-DK" sz="1400" smtClean="0"/>
-              <a:t>solution</a:t>
-            </a:r>
-            <a:endParaRPr lang="da-DK" sz="1400" smtClean="0"/>
+              <a:t>Gruppens C# solution</a:t>
+            </a:r>
           </a:p>
         </p:txBody>
       </p:sp>
@@ -7964,13 +9033,8 @@
             <a:pPr algn="r"/>
             <a:r>
               <a:rPr lang="da-DK" sz="1400" smtClean="0"/>
-              <a:t>Gruppens C# </a:t>
-            </a:r>
-            <a:r>
-              <a:rPr lang="da-DK" sz="1400" smtClean="0"/>
-              <a:t>solution</a:t>
-            </a:r>
-            <a:endParaRPr lang="da-DK" sz="1400" smtClean="0"/>
+              <a:t>Gruppens C# solution</a:t>
+            </a:r>
           </a:p>
         </p:txBody>
       </p:sp>
@@ -8082,6 +9146,18 @@
   <p:clrMapOvr>
     <a:masterClrMapping/>
   </p:clrMapOvr>
+  <mc:AlternateContent xmlns:mc="http://schemas.openxmlformats.org/markup-compatibility/2006">
+    <mc:Choice xmlns:p14="http://schemas.microsoft.com/office/powerpoint/2010/main" Requires="p14">
+      <p:transition spd="med" p14:dur="700">
+        <p:fade/>
+      </p:transition>
+    </mc:Choice>
+    <mc:Fallback>
+      <p:transition spd="med">
+        <p:fade/>
+      </p:transition>
+    </mc:Fallback>
+  </mc:AlternateContent>
   <p:timing>
     <p:tnLst>
       <p:par>
@@ -8250,7 +9326,6 @@
               <a:rPr lang="da-DK" sz="2400" i="1" smtClean="0"/>
               <a:t>solution</a:t>
             </a:r>
-            <a:endParaRPr lang="da-DK" sz="2400" i="1" smtClean="0"/>
           </a:p>
           <a:p>
             <a:endParaRPr lang="da-DK" sz="2400"/>
@@ -8349,13 +9424,8 @@
             <a:pPr algn="r"/>
             <a:r>
               <a:rPr lang="da-DK" sz="1400" smtClean="0"/>
-              <a:t>Gruppens C# </a:t>
-            </a:r>
-            <a:r>
-              <a:rPr lang="da-DK" sz="1400" smtClean="0"/>
-              <a:t>solution</a:t>
-            </a:r>
-            <a:endParaRPr lang="da-DK" sz="1400" smtClean="0"/>
+              <a:t>Gruppens C# solution</a:t>
+            </a:r>
           </a:p>
         </p:txBody>
       </p:sp>
@@ -8397,13 +9467,8 @@
             <a:pPr algn="r"/>
             <a:r>
               <a:rPr lang="da-DK" sz="1400" smtClean="0"/>
-              <a:t>Gruppens C# </a:t>
-            </a:r>
-            <a:r>
-              <a:rPr lang="da-DK" sz="1400" smtClean="0"/>
-              <a:t>solution</a:t>
-            </a:r>
-            <a:endParaRPr lang="da-DK" sz="1400" smtClean="0"/>
+              <a:t>Gruppens C# solution</a:t>
+            </a:r>
           </a:p>
         </p:txBody>
       </p:sp>
@@ -8445,13 +9510,8 @@
             <a:pPr algn="r"/>
             <a:r>
               <a:rPr lang="da-DK" sz="1400" smtClean="0"/>
-              <a:t>Gruppens C# </a:t>
-            </a:r>
-            <a:r>
-              <a:rPr lang="da-DK" sz="1400" smtClean="0"/>
-              <a:t>solution</a:t>
-            </a:r>
-            <a:endParaRPr lang="da-DK" sz="1400" smtClean="0"/>
+              <a:t>Gruppens C# solution</a:t>
+            </a:r>
           </a:p>
         </p:txBody>
       </p:sp>
@@ -8737,7 +9797,6 @@
               <a:rPr lang="da-DK" sz="2400" smtClean="0"/>
               <a:t>, da .csproj-filen for gruppens solution er blevet ændret!</a:t>
             </a:r>
-            <a:endParaRPr lang="da-DK" sz="2400" smtClean="0"/>
           </a:p>
           <a:p>
             <a:endParaRPr lang="da-DK" sz="2400"/>
@@ -8836,13 +9895,8 @@
             <a:pPr algn="r"/>
             <a:r>
               <a:rPr lang="da-DK" sz="1400" smtClean="0"/>
-              <a:t>Gruppens C# </a:t>
-            </a:r>
-            <a:r>
-              <a:rPr lang="da-DK" sz="1400" smtClean="0"/>
-              <a:t>solution</a:t>
-            </a:r>
-            <a:endParaRPr lang="da-DK" sz="1400" smtClean="0"/>
+              <a:t>Gruppens C# solution</a:t>
+            </a:r>
           </a:p>
         </p:txBody>
       </p:sp>
@@ -8889,13 +9943,8 @@
             <a:pPr algn="r"/>
             <a:r>
               <a:rPr lang="da-DK" sz="1400" smtClean="0"/>
-              <a:t>Gruppens C# </a:t>
-            </a:r>
-            <a:r>
-              <a:rPr lang="da-DK" sz="1400" smtClean="0"/>
-              <a:t>solution</a:t>
-            </a:r>
-            <a:endParaRPr lang="da-DK" sz="1400" smtClean="0"/>
+              <a:t>Gruppens C# solution</a:t>
+            </a:r>
           </a:p>
         </p:txBody>
       </p:sp>
@@ -8943,13 +9992,8 @@
             <a:pPr algn="r"/>
             <a:r>
               <a:rPr lang="da-DK" sz="1400" smtClean="0"/>
-              <a:t>Gruppens C# </a:t>
-            </a:r>
-            <a:r>
-              <a:rPr lang="da-DK" sz="1400" smtClean="0"/>
-              <a:t>solution</a:t>
-            </a:r>
-            <a:endParaRPr lang="da-DK" sz="1400" smtClean="0"/>
+              <a:t>Gruppens C# solution</a:t>
+            </a:r>
           </a:p>
         </p:txBody>
       </p:sp>
@@ -8963,6 +10007,18 @@
   <p:clrMapOvr>
     <a:masterClrMapping/>
   </p:clrMapOvr>
+  <mc:AlternateContent xmlns:mc="http://schemas.openxmlformats.org/markup-compatibility/2006">
+    <mc:Choice xmlns:p14="http://schemas.microsoft.com/office/powerpoint/2010/main" Requires="p14">
+      <p:transition spd="med" p14:dur="700">
+        <p:fade/>
+      </p:transition>
+    </mc:Choice>
+    <mc:Fallback>
+      <p:transition spd="med">
+        <p:fade/>
+      </p:transition>
+    </mc:Fallback>
+  </mc:AlternateContent>
   <p:timing>
     <p:tnLst>
       <p:par>
@@ -9129,6 +10185,86 @@
           </a:p>
         </p:txBody>
       </p:sp>
+      <p:sp>
+        <p:nvSpPr>
+          <p:cNvPr id="4" name="AutoShape 4" descr="Billedresultat for ok icon"/>
+          <p:cNvSpPr>
+            <a:spLocks noChangeAspect="1" noChangeArrowheads="1"/>
+          </p:cNvSpPr>
+          <p:nvPr/>
+        </p:nvSpPr>
+        <p:spPr bwMode="auto">
+          <a:xfrm>
+            <a:off x="155575" y="-144463"/>
+            <a:ext cx="304800" cy="304801"/>
+          </a:xfrm>
+          <a:prstGeom prst="rect">
+            <a:avLst/>
+          </a:prstGeom>
+          <a:noFill/>
+          <a:extLst>
+            <a:ext uri="{909E8E84-426E-40DD-AFC4-6F175D3DCCD1}">
+              <a14:hiddenFill xmlns:a14="http://schemas.microsoft.com/office/drawing/2010/main">
+                <a:solidFill>
+                  <a:srgbClr val="FFFFFF"/>
+                </a:solidFill>
+              </a14:hiddenFill>
+            </a:ext>
+          </a:extLst>
+        </p:spPr>
+        <p:txBody>
+          <a:bodyPr vert="horz" wrap="square" lIns="91440" tIns="45720" rIns="91440" bIns="45720" numCol="1" anchor="t" anchorCtr="0" compatLnSpc="1">
+            <a:prstTxWarp prst="textNoShape">
+              <a:avLst/>
+            </a:prstTxWarp>
+          </a:bodyPr>
+          <a:lstStyle/>
+          <a:p>
+            <a:endParaRPr lang="da-DK"/>
+          </a:p>
+        </p:txBody>
+      </p:sp>
+      <p:pic>
+        <p:nvPicPr>
+          <p:cNvPr id="1032" name="Picture 8" descr="Relateret billede"/>
+          <p:cNvPicPr>
+            <a:picLocks noChangeAspect="1" noChangeArrowheads="1"/>
+          </p:cNvPicPr>
+          <p:nvPr/>
+        </p:nvPicPr>
+        <p:blipFill>
+          <a:blip r:embed="rId2">
+            <a:extLst>
+              <a:ext uri="{28A0092B-C50C-407E-A947-70E740481C1C}">
+                <a14:useLocalDpi xmlns:a14="http://schemas.microsoft.com/office/drawing/2010/main" val="0"/>
+              </a:ext>
+            </a:extLst>
+          </a:blip>
+          <a:srcRect/>
+          <a:stretch>
+            <a:fillRect/>
+          </a:stretch>
+        </p:blipFill>
+        <p:spPr bwMode="auto">
+          <a:xfrm>
+            <a:off x="8887286" y="2449325"/>
+            <a:ext cx="3063524" cy="3063524"/>
+          </a:xfrm>
+          <a:prstGeom prst="rect">
+            <a:avLst/>
+          </a:prstGeom>
+          <a:noFill/>
+          <a:extLst>
+            <a:ext uri="{909E8E84-426E-40DD-AFC4-6F175D3DCCD1}">
+              <a14:hiddenFill xmlns:a14="http://schemas.microsoft.com/office/drawing/2010/main">
+                <a:solidFill>
+                  <a:srgbClr val="FFFFFF"/>
+                </a:solidFill>
+              </a14:hiddenFill>
+            </a:ext>
+          </a:extLst>
+        </p:spPr>
+      </p:pic>
     </p:spTree>
     <p:extLst>
       <p:ext uri="{BB962C8B-B14F-4D97-AF65-F5344CB8AC3E}">
@@ -9139,6 +10275,13 @@
   <p:clrMapOvr>
     <a:masterClrMapping/>
   </p:clrMapOvr>
+  <p:timing>
+    <p:tnLst>
+      <p:par>
+        <p:cTn id="1" dur="indefinite" restart="never" nodeType="tmRoot"/>
+      </p:par>
+    </p:tnLst>
+  </p:timing>
 </p:sld>
 </file>
 
@@ -9255,6 +10398,13 @@
   <p:clrMapOvr>
     <a:masterClrMapping/>
   </p:clrMapOvr>
+  <p:timing>
+    <p:tnLst>
+      <p:par>
+        <p:cTn id="1" dur="indefinite" restart="never" nodeType="tmRoot"/>
+      </p:par>
+    </p:tnLst>
+  </p:timing>
 </p:sld>
 </file>
 
@@ -9324,8 +10474,13 @@
             </a:r>
             <a:r>
               <a:rPr lang="da-DK" b="1" smtClean="0"/>
-              <a:t>Team | Manage Connection</a:t>
-            </a:r>
+              <a:t>Team | Manage </a:t>
+            </a:r>
+            <a:r>
+              <a:rPr lang="da-DK" b="1" smtClean="0"/>
+              <a:t>Connections…</a:t>
+            </a:r>
+            <a:endParaRPr lang="da-DK" b="1" smtClean="0"/>
           </a:p>
           <a:p>
             <a:r>
@@ -9358,7 +10513,15 @@
             </a:r>
             <a:r>
               <a:rPr lang="da-DK" smtClean="0"/>
-              <a:t> logge ind på Team Project; det er Microsoft’s eget værktøj til versionsstyring</a:t>
+              <a:t> logge ind på Team </a:t>
+            </a:r>
+            <a:r>
+              <a:rPr lang="da-DK" smtClean="0"/>
+              <a:t>Services; </a:t>
+            </a:r>
+            <a:r>
+              <a:rPr lang="da-DK" smtClean="0"/>
+              <a:t>det er Microsoft’s eget værktøj til versionsstyring</a:t>
             </a:r>
             <a:endParaRPr lang="da-DK"/>
           </a:p>
@@ -9398,6 +10561,13 @@
   <p:clrMapOvr>
     <a:masterClrMapping/>
   </p:clrMapOvr>
+  <p:timing>
+    <p:tnLst>
+      <p:par>
+        <p:cTn id="1" dur="indefinite" restart="never" nodeType="tmRoot"/>
+      </p:par>
+    </p:tnLst>
+  </p:timing>
 </p:sld>
 </file>
 
@@ -9442,6 +10612,52 @@
           </a:prstGeom>
         </p:spPr>
       </p:pic>
+      <p:sp>
+        <p:nvSpPr>
+          <p:cNvPr id="2" name="Ellipse 1"/>
+          <p:cNvSpPr/>
+          <p:nvPr/>
+        </p:nvSpPr>
+        <p:spPr>
+          <a:xfrm>
+            <a:off x="5136543" y="2608028"/>
+            <a:ext cx="922351" cy="524786"/>
+          </a:xfrm>
+          <a:prstGeom prst="ellipse">
+            <a:avLst/>
+          </a:prstGeom>
+          <a:noFill/>
+          <a:ln w="76200">
+            <a:solidFill>
+              <a:srgbClr val="FF0000"/>
+            </a:solidFill>
+          </a:ln>
+        </p:spPr>
+        <p:style>
+          <a:lnRef idx="2">
+            <a:schemeClr val="accent1">
+              <a:shade val="50000"/>
+            </a:schemeClr>
+          </a:lnRef>
+          <a:fillRef idx="1">
+            <a:schemeClr val="accent1"/>
+          </a:fillRef>
+          <a:effectRef idx="0">
+            <a:schemeClr val="accent1"/>
+          </a:effectRef>
+          <a:fontRef idx="minor">
+            <a:schemeClr val="lt1"/>
+          </a:fontRef>
+        </p:style>
+        <p:txBody>
+          <a:bodyPr rtlCol="0" anchor="ctr"/>
+          <a:lstStyle/>
+          <a:p>
+            <a:pPr algn="ctr"/>
+            <a:endParaRPr lang="da-DK"/>
+          </a:p>
+        </p:txBody>
+      </p:sp>
     </p:spTree>
     <p:extLst>
       <p:ext uri="{BB962C8B-B14F-4D97-AF65-F5344CB8AC3E}">
@@ -9452,6 +10668,13 @@
   <p:clrMapOvr>
     <a:masterClrMapping/>
   </p:clrMapOvr>
+  <p:timing>
+    <p:tnLst>
+      <p:par>
+        <p:cTn id="1" dur="indefinite" restart="never" nodeType="tmRoot"/>
+      </p:par>
+    </p:tnLst>
+  </p:timing>
 </p:sld>
 </file>
 
@@ -9506,6 +10729,13 @@
   <p:clrMapOvr>
     <a:masterClrMapping/>
   </p:clrMapOvr>
+  <p:timing>
+    <p:tnLst>
+      <p:par>
+        <p:cTn id="1" dur="indefinite" restart="never" nodeType="tmRoot"/>
+      </p:par>
+    </p:tnLst>
+  </p:timing>
 </p:sld>
 </file>
 
@@ -9679,6 +10909,52 @@
           </a:prstGeom>
         </p:spPr>
       </p:pic>
+      <p:sp>
+        <p:nvSpPr>
+          <p:cNvPr id="5" name="Ellipse 4"/>
+          <p:cNvSpPr/>
+          <p:nvPr/>
+        </p:nvSpPr>
+        <p:spPr>
+          <a:xfrm>
+            <a:off x="8070574" y="1956021"/>
+            <a:ext cx="1796995" cy="524786"/>
+          </a:xfrm>
+          <a:prstGeom prst="ellipse">
+            <a:avLst/>
+          </a:prstGeom>
+          <a:noFill/>
+          <a:ln w="76200">
+            <a:solidFill>
+              <a:srgbClr val="FF0000"/>
+            </a:solidFill>
+          </a:ln>
+        </p:spPr>
+        <p:style>
+          <a:lnRef idx="2">
+            <a:schemeClr val="accent1">
+              <a:shade val="50000"/>
+            </a:schemeClr>
+          </a:lnRef>
+          <a:fillRef idx="1">
+            <a:schemeClr val="accent1"/>
+          </a:fillRef>
+          <a:effectRef idx="0">
+            <a:schemeClr val="accent1"/>
+          </a:effectRef>
+          <a:fontRef idx="minor">
+            <a:schemeClr val="lt1"/>
+          </a:fontRef>
+        </p:style>
+        <p:txBody>
+          <a:bodyPr rtlCol="0" anchor="ctr"/>
+          <a:lstStyle/>
+          <a:p>
+            <a:pPr algn="ctr"/>
+            <a:endParaRPr lang="da-DK"/>
+          </a:p>
+        </p:txBody>
+      </p:sp>
     </p:spTree>
     <p:extLst>
       <p:ext uri="{BB962C8B-B14F-4D97-AF65-F5344CB8AC3E}">
@@ -9689,6 +10965,13 @@
   <p:clrMapOvr>
     <a:masterClrMapping/>
   </p:clrMapOvr>
+  <p:timing>
+    <p:tnLst>
+      <p:par>
+        <p:cTn id="1" dur="indefinite" restart="never" nodeType="tmRoot"/>
+      </p:par>
+    </p:tnLst>
+  </p:timing>
 </p:sld>
 </file>
 
@@ -9726,11 +11009,7 @@
           <a:p>
             <a:r>
               <a:rPr lang="da-DK" b="1"/>
-              <a:t>Føj eksisterende solution til </a:t>
-            </a:r>
-            <a:r>
-              <a:rPr lang="da-DK" b="1"/>
-              <a:t>GitHub </a:t>
+              <a:t>Føj eksisterende solution til GitHub </a:t>
             </a:r>
             <a:r>
               <a:rPr lang="da-DK" b="1" smtClean="0"/>
@@ -9848,6 +11127,52 @@
           </a:prstGeom>
         </p:spPr>
       </p:pic>
+      <p:sp>
+        <p:nvSpPr>
+          <p:cNvPr id="5" name="Ellipse 4"/>
+          <p:cNvSpPr/>
+          <p:nvPr/>
+        </p:nvSpPr>
+        <p:spPr>
+          <a:xfrm>
+            <a:off x="8762337" y="2584886"/>
+            <a:ext cx="1606164" cy="563832"/>
+          </a:xfrm>
+          <a:prstGeom prst="ellipse">
+            <a:avLst/>
+          </a:prstGeom>
+          <a:noFill/>
+          <a:ln w="76200">
+            <a:solidFill>
+              <a:srgbClr val="FF0000"/>
+            </a:solidFill>
+          </a:ln>
+        </p:spPr>
+        <p:style>
+          <a:lnRef idx="2">
+            <a:schemeClr val="accent1">
+              <a:shade val="50000"/>
+            </a:schemeClr>
+          </a:lnRef>
+          <a:fillRef idx="1">
+            <a:schemeClr val="accent1"/>
+          </a:fillRef>
+          <a:effectRef idx="0">
+            <a:schemeClr val="accent1"/>
+          </a:effectRef>
+          <a:fontRef idx="minor">
+            <a:schemeClr val="lt1"/>
+          </a:fontRef>
+        </p:style>
+        <p:txBody>
+          <a:bodyPr rtlCol="0" anchor="ctr"/>
+          <a:lstStyle/>
+          <a:p>
+            <a:pPr algn="ctr"/>
+            <a:endParaRPr lang="da-DK"/>
+          </a:p>
+        </p:txBody>
+      </p:sp>
     </p:spTree>
     <p:extLst>
       <p:ext uri="{BB962C8B-B14F-4D97-AF65-F5344CB8AC3E}">
@@ -9858,6 +11183,13 @@
   <p:clrMapOvr>
     <a:masterClrMapping/>
   </p:clrMapOvr>
+  <p:timing>
+    <p:tnLst>
+      <p:par>
+        <p:cTn id="1" dur="indefinite" restart="never" nodeType="tmRoot"/>
+      </p:par>
+    </p:tnLst>
+  </p:timing>
 </p:sld>
 </file>
 

</xml_diff>